<commit_message>
add content for concept
TPR, FPR, Precision Recall diagram => F1
</commit_message>
<xml_diff>
--- a/roc/ROC_F1.pptx
+++ b/roc/ROC_F1.pptx
@@ -196,7 +196,7 @@
           <a:p>
             <a:fld id="{3C4BB34E-F926-C34D-9177-16A1C498D17C}" type="datetimeFigureOut">
               <a:rPr lang="en-US" smtClean="0"/>
-              <a:t>12/27/15</a:t>
+              <a:t>20/11/16</a:t>
             </a:fld>
             <a:endParaRPr lang="en-US"/>
           </a:p>
@@ -464,6 +464,420 @@
 </p:notesMaster>
 </file>
 
+<file path=ppt/notesSlides/notesSlide1.xml><?xml version="1.0" encoding="utf-8"?>
+<p:notes xmlns:a="http://schemas.openxmlformats.org/drawingml/2006/main" xmlns:r="http://schemas.openxmlformats.org/officeDocument/2006/relationships" xmlns:p="http://schemas.openxmlformats.org/presentationml/2006/main">
+  <p:cSld>
+    <p:spTree>
+      <p:nvGrpSpPr>
+        <p:cNvPr id="1" name=""/>
+        <p:cNvGrpSpPr/>
+        <p:nvPr/>
+      </p:nvGrpSpPr>
+      <p:grpSpPr>
+        <a:xfrm>
+          <a:off x="0" y="0"/>
+          <a:ext cx="0" cy="0"/>
+          <a:chOff x="0" y="0"/>
+          <a:chExt cx="0" cy="0"/>
+        </a:xfrm>
+      </p:grpSpPr>
+      <p:sp>
+        <p:nvSpPr>
+          <p:cNvPr id="2" name="Slide Image Placeholder 1"/>
+          <p:cNvSpPr>
+            <a:spLocks noGrp="1" noRot="1" noChangeAspect="1"/>
+          </p:cNvSpPr>
+          <p:nvPr>
+            <p:ph type="sldImg"/>
+          </p:nvPr>
+        </p:nvSpPr>
+        <p:spPr/>
+      </p:sp>
+      <p:sp>
+        <p:nvSpPr>
+          <p:cNvPr id="3" name="Notes Placeholder 2"/>
+          <p:cNvSpPr>
+            <a:spLocks noGrp="1"/>
+          </p:cNvSpPr>
+          <p:nvPr>
+            <p:ph type="body" idx="1"/>
+          </p:nvPr>
+        </p:nvSpPr>
+        <p:spPr/>
+        <p:txBody>
+          <a:bodyPr/>
+          <a:lstStyle/>
+          <a:p>
+            <a:r>
+              <a:rPr lang="zh-TW" altLang="en-US" sz="1200" kern="1200" dirty="0" smtClean="0">
+                <a:solidFill>
+                  <a:schemeClr val="tx1"/>
+                </a:solidFill>
+                <a:latin typeface="+mn-lt"/>
+                <a:ea typeface="+mn-ea"/>
+                <a:cs typeface="+mn-cs"/>
+              </a:rPr>
+              <a:t>真阳性率（灵敏度）为纵坐标</a:t>
+            </a:r>
+            <a:endParaRPr lang="en-US" altLang="zh-TW" sz="1200" kern="1200" dirty="0" smtClean="0">
+              <a:solidFill>
+                <a:schemeClr val="tx1"/>
+              </a:solidFill>
+              <a:latin typeface="+mn-lt"/>
+              <a:ea typeface="+mn-ea"/>
+              <a:cs typeface="+mn-cs"/>
+            </a:endParaRPr>
+          </a:p>
+          <a:p>
+            <a:r>
+              <a:rPr lang="zh-TW" altLang="en-US" sz="1200" kern="1200" dirty="0" smtClean="0">
+                <a:solidFill>
+                  <a:schemeClr val="tx1"/>
+                </a:solidFill>
+                <a:latin typeface="+mn-lt"/>
+                <a:ea typeface="+mn-ea"/>
+                <a:cs typeface="+mn-cs"/>
+              </a:rPr>
+              <a:t>假阳性率（</a:t>
+            </a:r>
+            <a:r>
+              <a:rPr lang="en-US" altLang="zh-TW" sz="1200" kern="1200" dirty="0" smtClean="0">
+                <a:solidFill>
+                  <a:schemeClr val="tx1"/>
+                </a:solidFill>
+                <a:latin typeface="+mn-lt"/>
+                <a:ea typeface="+mn-ea"/>
+                <a:cs typeface="+mn-cs"/>
+              </a:rPr>
+              <a:t>1-</a:t>
+            </a:r>
+            <a:r>
+              <a:rPr lang="zh-TW" altLang="en-US" sz="1200" kern="1200" dirty="0" smtClean="0">
+                <a:solidFill>
+                  <a:schemeClr val="tx1"/>
+                </a:solidFill>
+                <a:latin typeface="+mn-lt"/>
+                <a:ea typeface="+mn-ea"/>
+                <a:cs typeface="+mn-cs"/>
+              </a:rPr>
+              <a:t>特异度）为横坐标</a:t>
+            </a:r>
+            <a:r>
+              <a:rPr lang="en-US" altLang="zh-TW" sz="1200" kern="1200" dirty="0" smtClean="0">
+                <a:solidFill>
+                  <a:schemeClr val="tx1"/>
+                </a:solidFill>
+                <a:latin typeface="+mn-lt"/>
+                <a:ea typeface="+mn-ea"/>
+                <a:cs typeface="+mn-cs"/>
+              </a:rPr>
+              <a:t>.</a:t>
+            </a:r>
+            <a:r>
+              <a:rPr lang="zh-CN" altLang="en-US" sz="1200" kern="1200" dirty="0" smtClean="0">
+                <a:solidFill>
+                  <a:schemeClr val="tx1"/>
+                </a:solidFill>
+                <a:latin typeface="+mn-lt"/>
+                <a:ea typeface="+mn-ea"/>
+                <a:cs typeface="+mn-cs"/>
+              </a:rPr>
+              <a:t> </a:t>
+            </a:r>
+            <a:r>
+              <a:rPr lang="en-US" altLang="zh-TW" sz="1200" kern="1200" dirty="0" smtClean="0">
+                <a:solidFill>
+                  <a:schemeClr val="tx1"/>
+                </a:solidFill>
+                <a:latin typeface="+mn-lt"/>
+                <a:ea typeface="+mn-ea"/>
+                <a:cs typeface="+mn-cs"/>
+              </a:rPr>
+              <a:t>FPR</a:t>
+            </a:r>
+            <a:r>
+              <a:rPr lang="zh-CN" altLang="en-US" sz="1200" kern="1200" dirty="0" smtClean="0">
+                <a:solidFill>
+                  <a:schemeClr val="tx1"/>
+                </a:solidFill>
+                <a:latin typeface="+mn-lt"/>
+                <a:ea typeface="+mn-ea"/>
+                <a:cs typeface="+mn-cs"/>
+              </a:rPr>
+              <a:t> </a:t>
+            </a:r>
+            <a:r>
+              <a:rPr lang="en-US" altLang="zh-CN" sz="1200" kern="1200" dirty="0" smtClean="0">
+                <a:solidFill>
+                  <a:schemeClr val="tx1"/>
+                </a:solidFill>
+                <a:latin typeface="+mn-lt"/>
+                <a:ea typeface="+mn-ea"/>
+                <a:cs typeface="+mn-cs"/>
+              </a:rPr>
+              <a:t>=</a:t>
+            </a:r>
+            <a:r>
+              <a:rPr lang="zh-CN" altLang="en-US" sz="1200" kern="1200" dirty="0" smtClean="0">
+                <a:solidFill>
+                  <a:schemeClr val="tx1"/>
+                </a:solidFill>
+                <a:latin typeface="+mn-lt"/>
+                <a:ea typeface="+mn-ea"/>
+                <a:cs typeface="+mn-cs"/>
+              </a:rPr>
+              <a:t> </a:t>
+            </a:r>
+            <a:r>
+              <a:rPr lang="en-US" altLang="zh-CN" sz="1200" kern="1200" dirty="0" smtClean="0">
+                <a:solidFill>
+                  <a:schemeClr val="tx1"/>
+                </a:solidFill>
+                <a:latin typeface="+mn-lt"/>
+                <a:ea typeface="+mn-ea"/>
+                <a:cs typeface="+mn-cs"/>
+              </a:rPr>
+              <a:t>FP/(FP+TN)</a:t>
+            </a:r>
+            <a:r>
+              <a:rPr lang="zh-CN" altLang="en-US" sz="1200" kern="1200" dirty="0" smtClean="0">
+                <a:solidFill>
+                  <a:schemeClr val="tx1"/>
+                </a:solidFill>
+                <a:latin typeface="+mn-lt"/>
+                <a:ea typeface="+mn-ea"/>
+                <a:cs typeface="+mn-cs"/>
+              </a:rPr>
+              <a:t> </a:t>
+            </a:r>
+            <a:r>
+              <a:rPr lang="en-US" altLang="zh-CN" sz="1200" kern="1200" dirty="0" smtClean="0">
+                <a:solidFill>
+                  <a:schemeClr val="tx1"/>
+                </a:solidFill>
+                <a:latin typeface="+mn-lt"/>
+                <a:ea typeface="+mn-ea"/>
+                <a:cs typeface="+mn-cs"/>
+              </a:rPr>
+              <a:t>	=</a:t>
+            </a:r>
+            <a:r>
+              <a:rPr lang="zh-CN" altLang="en-US" sz="1200" kern="1200" dirty="0" smtClean="0">
+                <a:solidFill>
+                  <a:schemeClr val="tx1"/>
+                </a:solidFill>
+                <a:latin typeface="+mn-lt"/>
+                <a:ea typeface="+mn-ea"/>
+                <a:cs typeface="+mn-cs"/>
+              </a:rPr>
+              <a:t> </a:t>
+            </a:r>
+            <a:r>
+              <a:rPr lang="zh-CN" altLang="zh-CN" sz="1200" kern="1200" dirty="0" smtClean="0">
+                <a:solidFill>
+                  <a:schemeClr val="tx1"/>
+                </a:solidFill>
+                <a:latin typeface="+mn-lt"/>
+                <a:ea typeface="+mn-ea"/>
+                <a:cs typeface="+mn-cs"/>
+              </a:rPr>
+              <a:t>1</a:t>
+            </a:r>
+            <a:r>
+              <a:rPr lang="en-US" altLang="zh-CN" sz="1200" kern="1200" dirty="0" smtClean="0">
+                <a:solidFill>
+                  <a:schemeClr val="tx1"/>
+                </a:solidFill>
+                <a:latin typeface="+mn-lt"/>
+                <a:ea typeface="+mn-ea"/>
+                <a:cs typeface="+mn-cs"/>
+              </a:rPr>
+              <a:t>-TNR</a:t>
+            </a:r>
+          </a:p>
+          <a:p>
+            <a:r>
+              <a:rPr lang="en-US" altLang="zh-TW" sz="1200" kern="1200" dirty="0" smtClean="0">
+                <a:solidFill>
+                  <a:schemeClr val="tx1"/>
+                </a:solidFill>
+                <a:latin typeface="+mn-lt"/>
+                <a:ea typeface="+mn-ea"/>
+                <a:cs typeface="+mn-cs"/>
+              </a:rPr>
+              <a:t>TNR</a:t>
+            </a:r>
+            <a:r>
+              <a:rPr lang="zh-CN" altLang="en-US" sz="1200" kern="1200" dirty="0" smtClean="0">
+                <a:solidFill>
+                  <a:schemeClr val="tx1"/>
+                </a:solidFill>
+                <a:latin typeface="+mn-lt"/>
+                <a:ea typeface="+mn-ea"/>
+                <a:cs typeface="+mn-cs"/>
+              </a:rPr>
+              <a:t> </a:t>
+            </a:r>
+            <a:r>
+              <a:rPr lang="en-US" altLang="zh-TW" sz="1200" kern="1200" dirty="0" smtClean="0">
+                <a:solidFill>
+                  <a:schemeClr val="tx1"/>
+                </a:solidFill>
+                <a:latin typeface="+mn-lt"/>
+                <a:ea typeface="+mn-ea"/>
+                <a:cs typeface="+mn-cs"/>
+              </a:rPr>
+              <a:t>True</a:t>
+            </a:r>
+            <a:r>
+              <a:rPr lang="zh-CN" altLang="en-US" sz="1200" kern="1200" dirty="0" smtClean="0">
+                <a:solidFill>
+                  <a:schemeClr val="tx1"/>
+                </a:solidFill>
+                <a:latin typeface="+mn-lt"/>
+                <a:ea typeface="+mn-ea"/>
+                <a:cs typeface="+mn-cs"/>
+              </a:rPr>
+              <a:t> </a:t>
+            </a:r>
+            <a:r>
+              <a:rPr lang="en-US" altLang="zh-CN" sz="1200" kern="1200" dirty="0" smtClean="0">
+                <a:solidFill>
+                  <a:schemeClr val="tx1"/>
+                </a:solidFill>
+                <a:latin typeface="+mn-lt"/>
+                <a:ea typeface="+mn-ea"/>
+                <a:cs typeface="+mn-cs"/>
+              </a:rPr>
+              <a:t>Negative</a:t>
+            </a:r>
+            <a:r>
+              <a:rPr lang="zh-CN" altLang="en-US" sz="1200" kern="1200" dirty="0" smtClean="0">
+                <a:solidFill>
+                  <a:schemeClr val="tx1"/>
+                </a:solidFill>
+                <a:latin typeface="+mn-lt"/>
+                <a:ea typeface="+mn-ea"/>
+                <a:cs typeface="+mn-cs"/>
+              </a:rPr>
+              <a:t> </a:t>
+            </a:r>
+            <a:r>
+              <a:rPr lang="en-US" altLang="zh-CN" sz="1200" kern="1200" dirty="0" smtClean="0">
+                <a:solidFill>
+                  <a:schemeClr val="tx1"/>
+                </a:solidFill>
+                <a:latin typeface="+mn-lt"/>
+                <a:ea typeface="+mn-ea"/>
+                <a:cs typeface="+mn-cs"/>
+              </a:rPr>
+              <a:t>Rate,</a:t>
+            </a:r>
+            <a:r>
+              <a:rPr lang="zh-CN" altLang="en-US" sz="1200" kern="1200" dirty="0" smtClean="0">
+                <a:solidFill>
+                  <a:schemeClr val="tx1"/>
+                </a:solidFill>
+                <a:latin typeface="+mn-lt"/>
+                <a:ea typeface="+mn-ea"/>
+                <a:cs typeface="+mn-cs"/>
+              </a:rPr>
+              <a:t> </a:t>
+            </a:r>
+            <a:r>
+              <a:rPr lang="en-US" altLang="zh-CN" sz="1200" kern="1200" dirty="0" smtClean="0">
+                <a:solidFill>
+                  <a:schemeClr val="tx1"/>
+                </a:solidFill>
+                <a:latin typeface="+mn-lt"/>
+                <a:ea typeface="+mn-ea"/>
+                <a:cs typeface="+mn-cs"/>
+              </a:rPr>
+              <a:t>specificity</a:t>
+            </a:r>
+            <a:r>
+              <a:rPr lang="zh-CN" altLang="en-US" sz="1200" kern="1200" dirty="0" smtClean="0">
+                <a:solidFill>
+                  <a:schemeClr val="tx1"/>
+                </a:solidFill>
+                <a:latin typeface="+mn-lt"/>
+                <a:ea typeface="+mn-ea"/>
+                <a:cs typeface="+mn-cs"/>
+              </a:rPr>
+              <a:t> </a:t>
+            </a:r>
+            <a:r>
+              <a:rPr lang="en-US" altLang="zh-CN" sz="1200" kern="1200" dirty="0" smtClean="0">
+                <a:solidFill>
+                  <a:schemeClr val="tx1"/>
+                </a:solidFill>
+                <a:latin typeface="+mn-lt"/>
+                <a:ea typeface="+mn-ea"/>
+                <a:cs typeface="+mn-cs"/>
+              </a:rPr>
+              <a:t>(</a:t>
+            </a:r>
+            <a:r>
+              <a:rPr lang="zh-CN" altLang="en-US" sz="1200" kern="1200" dirty="0" smtClean="0">
+                <a:solidFill>
+                  <a:schemeClr val="tx1"/>
+                </a:solidFill>
+                <a:latin typeface="+mn-lt"/>
+                <a:ea typeface="+mn-ea"/>
+                <a:cs typeface="+mn-cs"/>
+              </a:rPr>
+              <a:t>特异度？？？）</a:t>
+            </a:r>
+            <a:endParaRPr lang="en-US" altLang="zh-TW" sz="1200" kern="1200" dirty="0" smtClean="0">
+              <a:solidFill>
+                <a:schemeClr val="tx1"/>
+              </a:solidFill>
+              <a:latin typeface="+mn-lt"/>
+              <a:ea typeface="+mn-ea"/>
+              <a:cs typeface="+mn-cs"/>
+            </a:endParaRPr>
+          </a:p>
+          <a:p>
+            <a:endParaRPr lang="en-US" dirty="0"/>
+          </a:p>
+        </p:txBody>
+      </p:sp>
+      <p:sp>
+        <p:nvSpPr>
+          <p:cNvPr id="4" name="Slide Number Placeholder 3"/>
+          <p:cNvSpPr>
+            <a:spLocks noGrp="1"/>
+          </p:cNvSpPr>
+          <p:nvPr>
+            <p:ph type="sldNum" sz="quarter" idx="10"/>
+          </p:nvPr>
+        </p:nvSpPr>
+        <p:spPr/>
+        <p:txBody>
+          <a:bodyPr/>
+          <a:lstStyle/>
+          <a:p>
+            <a:fld id="{A8BD1706-EBCC-A643-9E7F-0704A0F930C6}" type="slidenum">
+              <a:rPr lang="en-US" smtClean="0"/>
+              <a:t>2</a:t>
+            </a:fld>
+            <a:endParaRPr lang="en-US"/>
+          </a:p>
+        </p:txBody>
+      </p:sp>
+    </p:spTree>
+    <p:extLst>
+      <p:ext uri="{BB962C8B-B14F-4D97-AF65-F5344CB8AC3E}">
+        <p14:creationId xmlns:p14="http://schemas.microsoft.com/office/powerpoint/2010/main" val="2048385240"/>
+      </p:ext>
+    </p:extLst>
+  </p:cSld>
+  <p:clrMapOvr>
+    <a:masterClrMapping/>
+  </p:clrMapOvr>
+</p:notes>
+</file>
+
 <file path=ppt/slideLayouts/slideLayout1.xml><?xml version="1.0" encoding="utf-8"?>
 <p:sldLayout xmlns:a="http://schemas.openxmlformats.org/drawingml/2006/main" xmlns:r="http://schemas.openxmlformats.org/officeDocument/2006/relationships" xmlns:p="http://schemas.openxmlformats.org/presentationml/2006/main" type="title" preserve="1">
   <p:cSld name="Title Slide">
@@ -645,7 +1059,7 @@
           <a:p>
             <a:fld id="{216C5678-EE20-4FA5-88E2-6E0BD67A2E26}" type="datetime1">
               <a:rPr lang="en-US" smtClean="0"/>
-              <a:t>12/27/15</a:t>
+              <a:t>20/11/16</a:t>
             </a:fld>
             <a:endParaRPr lang="en-US" dirty="0"/>
           </a:p>
@@ -820,7 +1234,7 @@
           <a:p>
             <a:fld id="{EA051B39-B140-43FE-96DB-472A2B59CE7C}" type="datetime1">
               <a:rPr lang="en-US" smtClean="0"/>
-              <a:t>12/27/15</a:t>
+              <a:t>20/11/16</a:t>
             </a:fld>
             <a:endParaRPr lang="en-US"/>
           </a:p>
@@ -1005,7 +1419,7 @@
           <a:p>
             <a:fld id="{DA600BB2-27C5-458B-ABCE-839C88CF47CE}" type="datetime1">
               <a:rPr lang="en-US" smtClean="0"/>
-              <a:t>12/27/15</a:t>
+              <a:t>20/11/16</a:t>
             </a:fld>
             <a:endParaRPr lang="en-US"/>
           </a:p>
@@ -1180,7 +1594,7 @@
           <a:p>
             <a:fld id="{B11D738E-8962-435F-8C43-147B8DD7E819}" type="datetime1">
               <a:rPr lang="en-US" smtClean="0"/>
-              <a:t>12/27/15</a:t>
+              <a:t>20/11/16</a:t>
             </a:fld>
             <a:endParaRPr lang="en-US"/>
           </a:p>
@@ -1431,7 +1845,7 @@
           <a:p>
             <a:fld id="{09CAEA93-55E7-4DA9-90C2-089A26EEFEC4}" type="datetime1">
               <a:rPr lang="en-US" smtClean="0"/>
-              <a:t>12/27/15</a:t>
+              <a:t>20/11/16</a:t>
             </a:fld>
             <a:endParaRPr lang="en-US"/>
           </a:p>
@@ -1724,7 +2138,7 @@
           <a:p>
             <a:fld id="{E34CF3C7-6809-4F39-BD67-A75817BDDE0A}" type="datetime1">
               <a:rPr lang="en-US" smtClean="0"/>
-              <a:t>12/27/15</a:t>
+              <a:t>20/11/16</a:t>
             </a:fld>
             <a:endParaRPr lang="en-US"/>
           </a:p>
@@ -2151,7 +2565,7 @@
           <a:p>
             <a:fld id="{F7EAEB24-CE78-465C-A726-91D0868FA48F}" type="datetime1">
               <a:rPr lang="en-US" smtClean="0"/>
-              <a:t>12/27/15</a:t>
+              <a:t>20/11/16</a:t>
             </a:fld>
             <a:endParaRPr lang="en-US"/>
           </a:p>
@@ -2274,7 +2688,7 @@
           <a:p>
             <a:fld id="{40BAADF0-1749-4E8B-9691-B44A5F8C0895}" type="datetime1">
               <a:rPr lang="en-US" smtClean="0"/>
-              <a:t>12/27/15</a:t>
+              <a:t>20/11/16</a:t>
             </a:fld>
             <a:endParaRPr lang="en-US"/>
           </a:p>
@@ -2374,7 +2788,7 @@
           <a:p>
             <a:fld id="{A8AF628A-A867-4937-BBE5-207DB6F9C51A}" type="datetime1">
               <a:rPr lang="en-US" smtClean="0"/>
-              <a:t>12/27/15</a:t>
+              <a:t>20/11/16</a:t>
             </a:fld>
             <a:endParaRPr lang="en-US"/>
           </a:p>
@@ -2656,7 +3070,7 @@
           <a:p>
             <a:fld id="{118BBB94-68E6-4675-A946-F1C5994EDBD7}" type="datetime1">
               <a:rPr lang="en-US" smtClean="0"/>
-              <a:t>12/27/15</a:t>
+              <a:t>20/11/16</a:t>
             </a:fld>
             <a:endParaRPr lang="en-US"/>
           </a:p>
@@ -2914,7 +3328,7 @@
           <a:p>
             <a:fld id="{DC3B8377-21E3-4835-B75D-4E2847E2750F}" type="datetime1">
               <a:rPr lang="en-US" smtClean="0"/>
-              <a:t>12/27/15</a:t>
+              <a:t>20/11/16</a:t>
             </a:fld>
             <a:endParaRPr lang="en-US"/>
           </a:p>
@@ -3132,7 +3546,7 @@
           <a:p>
             <a:fld id="{B0C4986D-6BE9-4264-908F-02DB36FD8D6C}" type="datetime1">
               <a:rPr lang="en-US" smtClean="0"/>
-              <a:t>12/27/15</a:t>
+              <a:t>20/11/16</a:t>
             </a:fld>
             <a:endParaRPr lang="en-US" dirty="0"/>
           </a:p>
@@ -4260,6 +4674,65 @@
           </a:p>
         </p:txBody>
       </p:sp>
+      <p:sp>
+        <p:nvSpPr>
+          <p:cNvPr id="3" name="Rectangle 2"/>
+          <p:cNvSpPr/>
+          <p:nvPr/>
+        </p:nvSpPr>
+        <p:spPr>
+          <a:xfrm>
+            <a:off x="728870" y="6115683"/>
+            <a:ext cx="6758608" cy="523220"/>
+          </a:xfrm>
+          <a:prstGeom prst="rect">
+            <a:avLst/>
+          </a:prstGeom>
+        </p:spPr>
+        <p:txBody>
+          <a:bodyPr wrap="square">
+            <a:spAutoFit/>
+          </a:bodyPr>
+          <a:lstStyle/>
+          <a:p>
+            <a:r>
+              <a:rPr lang="en-US" sz="1400" dirty="0"/>
+              <a:t>受试者工作特征曲线 （receiver operating characteristic </a:t>
+            </a:r>
+            <a:r>
+              <a:rPr lang="en-US" sz="1400" dirty="0" err="1"/>
+              <a:t>curve，简称ROC曲线</a:t>
+            </a:r>
+            <a:r>
+              <a:rPr lang="en-US" sz="1400" dirty="0"/>
+              <a:t>），</a:t>
+            </a:r>
+            <a:r>
+              <a:rPr lang="en-US" sz="1400" dirty="0" err="1"/>
+              <a:t>又称为</a:t>
+            </a:r>
+            <a:r>
+              <a:rPr lang="en-US" sz="1400" dirty="0" err="1">
+                <a:hlinkClick r:id="rId3"/>
+              </a:rPr>
+              <a:t>感受性曲线（sensitivity</a:t>
+            </a:r>
+            <a:r>
+              <a:rPr lang="en-US" sz="1400" dirty="0">
+                <a:hlinkClick r:id="rId3"/>
+              </a:rPr>
+              <a:t> curve</a:t>
+            </a:r>
+            <a:r>
+              <a:rPr lang="en-US" sz="1400" dirty="0" smtClean="0">
+                <a:hlinkClick r:id="rId3"/>
+              </a:rPr>
+              <a:t>）</a:t>
+            </a:r>
+            <a:endParaRPr lang="en-US" sz="1400" dirty="0" smtClean="0"/>
+          </a:p>
+        </p:txBody>
+      </p:sp>
     </p:spTree>
     <p:extLst>
       <p:ext uri="{BB962C8B-B14F-4D97-AF65-F5344CB8AC3E}">
@@ -4323,14 +4796,14 @@
             <p:ph idx="1"/>
             <p:extLst>
               <p:ext uri="{D42A27DB-BD31-4B8C-83A1-F6EECF244321}">
-                <p14:modId xmlns:p14="http://schemas.microsoft.com/office/powerpoint/2010/main" val="3367559648"/>
+                <p14:modId xmlns:p14="http://schemas.microsoft.com/office/powerpoint/2010/main" val="2521885160"/>
               </p:ext>
             </p:extLst>
           </p:nvPr>
         </p:nvGraphicFramePr>
         <p:xfrm>
           <a:off x="1618822" y="1708925"/>
-          <a:ext cx="4233069" cy="1112520"/>
+          <a:ext cx="6111612" cy="1112520"/>
         </p:xfrm>
         <a:graphic>
           <a:graphicData uri="http://schemas.openxmlformats.org/drawingml/2006/table">
@@ -4339,9 +4812,9 @@
                 <a:tableStyleId>{5FD0F851-EC5A-4D38-B0AD-8093EC10F338}</a:tableStyleId>
               </a:tblPr>
               <a:tblGrid>
-                <a:gridCol w="557095"/>
-                <a:gridCol w="1536559"/>
-                <a:gridCol w="2139415"/>
+                <a:gridCol w="1385004"/>
+                <a:gridCol w="2208696"/>
+                <a:gridCol w="2517912"/>
               </a:tblGrid>
               <a:tr h="370840">
                 <a:tc>
@@ -4361,6 +4834,14 @@
                     <a:p>
                       <a:r>
                         <a:rPr lang="en-US" altLang="zh-CN" dirty="0" smtClean="0"/>
+                        <a:t>Predicted</a:t>
+                      </a:r>
+                      <a:r>
+                        <a:rPr lang="en-US" altLang="zh-CN" dirty="0" smtClean="0"/>
+                        <a:t> </a:t>
+                      </a:r>
+                      <a:r>
+                        <a:rPr lang="en-US" altLang="zh-CN" dirty="0" smtClean="0"/>
                         <a:t>Positive</a:t>
                       </a:r>
                       <a:endParaRPr lang="en-US" dirty="0"/>
@@ -4373,6 +4854,14 @@
                     <a:bodyPr/>
                     <a:lstStyle/>
                     <a:p>
+                      <a:r>
+                        <a:rPr lang="en-US" dirty="0" smtClean="0"/>
+                        <a:t>Predicted</a:t>
+                      </a:r>
+                      <a:r>
+                        <a:rPr lang="en-US" dirty="0" smtClean="0"/>
+                        <a:t> </a:t>
+                      </a:r>
                       <a:r>
                         <a:rPr lang="en-US" dirty="0" smtClean="0"/>
                         <a:t>Negative</a:t>
@@ -4391,6 +4880,14 @@
                     <a:p>
                       <a:r>
                         <a:rPr lang="en-US" dirty="0" smtClean="0"/>
+                        <a:t>Sample</a:t>
+                      </a:r>
+                      <a:r>
+                        <a:rPr lang="en-US" dirty="0" smtClean="0"/>
+                        <a:t> </a:t>
+                      </a:r>
+                      <a:r>
+                        <a:rPr lang="en-US" dirty="0" smtClean="0"/>
                         <a:t>√</a:t>
                       </a:r>
                       <a:endParaRPr lang="en-US" dirty="0"/>
@@ -4451,6 +4948,14 @@
                     <a:p>
                       <a:r>
                         <a:rPr lang="en-US" dirty="0" smtClean="0"/>
+                        <a:t>Sample</a:t>
+                      </a:r>
+                      <a:r>
+                        <a:rPr lang="en-US" dirty="0" smtClean="0"/>
+                        <a:t> </a:t>
+                      </a:r>
+                      <a:r>
+                        <a:rPr lang="en-US" dirty="0" smtClean="0"/>
                         <a:t>×</a:t>
                       </a:r>
                       <a:endParaRPr lang="en-US" dirty="0"/>
@@ -4579,6 +5084,10 @@
             </a:r>
             <a:r>
               <a:rPr lang="en-US" altLang="zh-CN" dirty="0" smtClean="0"/>
+              <a:t>(sensitivity)</a:t>
+            </a:r>
+            <a:r>
+              <a:rPr lang="en-US" altLang="zh-CN" dirty="0" smtClean="0"/>
               <a:t>,</a:t>
             </a:r>
             <a:r>
@@ -4698,6 +5207,14 @@
               <a:buChar char="•"/>
             </a:pPr>
             <a:r>
+              <a:rPr lang="en-US" altLang="zh-CN" dirty="0" smtClean="0"/>
+              <a:t>FDR</a:t>
+            </a:r>
+            <a:r>
+              <a:rPr lang="en-US" altLang="zh-CN" dirty="0" smtClean="0"/>
+              <a:t>, False Discovery Rate </a:t>
+            </a:r>
+            <a:r>
               <a:rPr lang="zh-CN" altLang="en-US" dirty="0" smtClean="0"/>
               <a:t>误报率 </a:t>
             </a:r>
@@ -4719,8 +5236,33 @@
             </a:r>
             <a:r>
               <a:rPr lang="en-US" altLang="zh-CN" dirty="0" smtClean="0"/>
-              <a:t>FP/(TP+FP)</a:t>
-            </a:r>
+              <a:t>FP/(TP+FP</a:t>
+            </a:r>
+            <a:r>
+              <a:rPr lang="en-US" altLang="zh-CN" dirty="0" smtClean="0"/>
+              <a:t>)</a:t>
+            </a:r>
+            <a:r>
+              <a:rPr lang="en-US" altLang="zh-CN" dirty="0" smtClean="0"/>
+              <a:t> </a:t>
+            </a:r>
+            <a:r>
+              <a:rPr lang="en-US" altLang="zh-CN" dirty="0"/>
+              <a:t>,</a:t>
+            </a:r>
+            <a:r>
+              <a:rPr lang="en-US" altLang="zh-CN" dirty="0" smtClean="0"/>
+              <a:t> </a:t>
+            </a:r>
+            <a:r>
+              <a:rPr lang="en-US" altLang="zh-CN" dirty="0"/>
+              <a:t>Type I </a:t>
+            </a:r>
+            <a:r>
+              <a:rPr lang="en-US" altLang="zh-CN" dirty="0" smtClean="0"/>
+              <a:t>error</a:t>
+            </a:r>
+            <a:endParaRPr lang="en-US" altLang="zh-CN" dirty="0" smtClean="0"/>
           </a:p>
           <a:p>
             <a:pPr marL="285750" indent="-285750">
@@ -4729,6 +5271,14 @@
             </a:pPr>
             <a:r>
               <a:rPr lang="en-US" altLang="zh-CN" dirty="0" smtClean="0"/>
+              <a:t>TNR</a:t>
+            </a:r>
+            <a:r>
+              <a:rPr lang="en-US" altLang="zh-CN" dirty="0" smtClean="0"/>
+              <a:t>, </a:t>
+            </a:r>
+            <a:r>
+              <a:rPr lang="en-US" altLang="zh-CN" dirty="0" smtClean="0"/>
               <a:t>Specificity</a:t>
             </a:r>
             <a:r>
@@ -4737,7 +5287,15 @@
             </a:r>
             <a:r>
               <a:rPr lang="en-US" altLang="zh-CN" dirty="0" smtClean="0"/>
-              <a:t>=TN/N</a:t>
+              <a:t>(SPC) </a:t>
+            </a:r>
+            <a:r>
+              <a:rPr lang="en-US" altLang="zh-CN" dirty="0" smtClean="0"/>
+              <a:t>=</a:t>
+            </a:r>
+            <a:r>
+              <a:rPr lang="en-US" altLang="zh-CN" dirty="0" smtClean="0"/>
+              <a:t>TN/N</a:t>
             </a:r>
             <a:r>
               <a:rPr lang="zh-CN" altLang="en-US" dirty="0" smtClean="0"/>
@@ -4752,6 +5310,14 @@
             </a:pPr>
             <a:r>
               <a:rPr lang="en-US" altLang="zh-CN" dirty="0" smtClean="0"/>
+              <a:t>FNR</a:t>
+            </a:r>
+            <a:r>
+              <a:rPr lang="en-US" altLang="zh-CN" dirty="0" smtClean="0"/>
+              <a:t>, </a:t>
+            </a:r>
+            <a:r>
+              <a:rPr lang="en-US" altLang="zh-CN" dirty="0" smtClean="0"/>
               <a:t>Missing</a:t>
             </a:r>
             <a:r>
@@ -4760,7 +5326,11 @@
             </a:r>
             <a:r>
               <a:rPr lang="en-US" altLang="zh-CN" dirty="0" smtClean="0"/>
-              <a:t>Alarm=FN/P</a:t>
+              <a:t>Rate=</a:t>
+            </a:r>
+            <a:r>
+              <a:rPr lang="en-US" altLang="zh-CN" dirty="0" smtClean="0"/>
+              <a:t>FN/P</a:t>
             </a:r>
             <a:r>
               <a:rPr lang="zh-CN" altLang="en-US" dirty="0" smtClean="0"/>
@@ -4788,15 +5358,53 @@
             </a:r>
             <a:r>
               <a:rPr lang="zh-CN" altLang="en-US" dirty="0" smtClean="0"/>
-              <a:t> 漏报率</a:t>
-            </a:r>
-            <a:endParaRPr lang="en-US" altLang="zh-CN" dirty="0" smtClean="0"/>
+              <a:t> </a:t>
+            </a:r>
+            <a:r>
+              <a:rPr lang="zh-CN" altLang="en-US" dirty="0" smtClean="0"/>
+              <a:t>漏报率</a:t>
+            </a:r>
+            <a:r>
+              <a:rPr lang="en-US" altLang="zh-CN" dirty="0"/>
+              <a:t> </a:t>
+            </a:r>
+            <a:r>
+              <a:rPr lang="en-US" altLang="zh-CN" dirty="0"/>
+              <a:t>Miss </a:t>
+            </a:r>
+            <a:r>
+              <a:rPr lang="en-US" altLang="zh-CN" dirty="0" smtClean="0"/>
+              <a:t>Rate</a:t>
+            </a:r>
+            <a:r>
+              <a:rPr lang="en-US" altLang="zh-CN" dirty="0" smtClean="0"/>
+              <a:t>, </a:t>
+            </a:r>
+            <a:r>
+              <a:rPr lang="en-US" altLang="zh-CN" dirty="0"/>
+              <a:t>FN Type II </a:t>
+            </a:r>
+            <a:r>
+              <a:rPr lang="en-US" altLang="zh-CN" dirty="0" smtClean="0"/>
+              <a:t>error</a:t>
+            </a:r>
           </a:p>
           <a:p>
             <a:pPr marL="285750" indent="-285750">
               <a:buFont typeface="Arial"/>
               <a:buChar char="•"/>
             </a:pPr>
+            <a:r>
+              <a:rPr lang="en-US" altLang="zh-CN" dirty="0" smtClean="0"/>
+              <a:t>Accuracy</a:t>
+            </a:r>
+            <a:r>
+              <a:rPr lang="en-US" altLang="zh-CN" dirty="0" smtClean="0"/>
+              <a:t>(ACC) = (TP+TN)/Total </a:t>
+            </a:r>
+            <a:endParaRPr lang="en-US" altLang="zh-CN" dirty="0" smtClean="0"/>
+          </a:p>
+          <a:p>
             <a:endParaRPr lang="en-US" altLang="zh-CN" dirty="0" smtClean="0"/>
           </a:p>
           <a:p>
@@ -4804,13 +5412,47 @@
               <a:buFont typeface="Arial"/>
               <a:buChar char="•"/>
             </a:pPr>
-            <a:endParaRPr lang="en-US" altLang="zh-CN" dirty="0" smtClean="0"/>
-          </a:p>
-          <a:p>
-            <a:pPr marL="285750" indent="-285750">
-              <a:buFont typeface="Arial"/>
-              <a:buChar char="•"/>
-            </a:pPr>
+            <a:endParaRPr lang="en-US" dirty="0"/>
+          </a:p>
+        </p:txBody>
+      </p:sp>
+      <p:sp>
+        <p:nvSpPr>
+          <p:cNvPr id="3" name="Rectangle 2"/>
+          <p:cNvSpPr/>
+          <p:nvPr/>
+        </p:nvSpPr>
+        <p:spPr>
+          <a:xfrm>
+            <a:off x="706782" y="6039872"/>
+            <a:ext cx="7023652" cy="369332"/>
+          </a:xfrm>
+          <a:prstGeom prst="rect">
+            <a:avLst/>
+          </a:prstGeom>
+        </p:spPr>
+        <p:txBody>
+          <a:bodyPr wrap="square">
+            <a:spAutoFit/>
+          </a:bodyPr>
+          <a:lstStyle/>
+          <a:p>
+            <a:r>
+              <a:rPr lang="en-US" dirty="0"/>
+              <a:t>https://</a:t>
+            </a:r>
+            <a:r>
+              <a:rPr lang="en-US" dirty="0" err="1"/>
+              <a:t>en.wikipedia.org</a:t>
+            </a:r>
+            <a:r>
+              <a:rPr lang="en-US" dirty="0"/>
+              <a:t>/wiki/</a:t>
+            </a:r>
+            <a:r>
+              <a:rPr lang="en-US" dirty="0" err="1"/>
+              <a:t>Receiver_operating_characteristic</a:t>
+            </a:r>
             <a:endParaRPr lang="en-US" dirty="0"/>
           </a:p>
         </p:txBody>
@@ -6038,11 +6680,7 @@
           <a:p>
             <a:r>
               <a:rPr lang="en-US" dirty="0" smtClean="0"/>
-              <a:t>F</a:t>
-            </a:r>
-            <a:r>
-              <a:rPr lang="en-US" dirty="0" smtClean="0"/>
-              <a:t>1</a:t>
+              <a:t>F1</a:t>
             </a:r>
             <a:endParaRPr lang="en-US" dirty="0"/>
           </a:p>
@@ -6065,11 +6703,7 @@
           <a:p>
             <a:r>
               <a:rPr lang="en-US" dirty="0" smtClean="0"/>
-              <a:t>F</a:t>
-            </a:r>
-            <a:r>
-              <a:rPr lang="en-US" dirty="0" smtClean="0"/>
-              <a:t>1 = 2 precision * recall/(precision  </a:t>
+              <a:t>F1 = 2 precision * recall/(precision  </a:t>
             </a:r>
             <a:r>
               <a:rPr lang="en-US" altLang="zh-CN" dirty="0" smtClean="0"/>
@@ -6081,8 +6715,13 @@
             </a:r>
             <a:r>
               <a:rPr lang="en-US" altLang="zh-CN" dirty="0" smtClean="0"/>
-              <a:t>recall)</a:t>
-            </a:r>
+              <a:t>recall</a:t>
+            </a:r>
+            <a:r>
+              <a:rPr lang="en-US" altLang="zh-CN" dirty="0" smtClean="0"/>
+              <a:t>)</a:t>
+            </a:r>
+            <a:endParaRPr lang="en-US" altLang="zh-CN" dirty="0"/>
           </a:p>
           <a:p>
             <a:r>
@@ -6090,6 +6729,41 @@
               <a:t>=</a:t>
             </a:r>
             <a:r>
+              <a:rPr lang="mr-IN" dirty="0"/>
+              <a:t>2</a:t>
+            </a:r>
+            <a:r>
+              <a:rPr lang="mr-IN" dirty="0" smtClean="0"/>
+              <a:t>/</a:t>
+            </a:r>
+            <a:r>
+              <a:rPr lang="zh-CN" altLang="en-US" dirty="0"/>
+              <a:t>(</a:t>
+            </a:r>
+            <a:r>
+              <a:rPr lang="mr-IN" smtClean="0"/>
+              <a:t>1</a:t>
+            </a:r>
+            <a:r>
+              <a:rPr lang="mr-IN" dirty="0"/>
+              <a:t>/P+1/</a:t>
+            </a:r>
+            <a:r>
+              <a:rPr lang="mr-IN" dirty="0" smtClean="0"/>
+              <a:t>R</a:t>
+            </a:r>
+            <a:r>
+              <a:rPr lang="zh-CN" altLang="en-US" dirty="0"/>
+              <a:t>)</a:t>
+            </a:r>
+            <a:endParaRPr lang="en-US" altLang="zh-CN" dirty="0" smtClean="0"/>
+          </a:p>
+          <a:p>
+            <a:r>
+              <a:rPr lang="zh-CN" altLang="zh-CN" dirty="0" smtClean="0"/>
+              <a:t>=</a:t>
+            </a:r>
+            <a:r>
               <a:rPr lang="zh-CN" altLang="en-US" dirty="0" smtClean="0"/>
               <a:t> </a:t>
             </a:r>
@@ -6111,11 +6785,7 @@
             </a:r>
             <a:r>
               <a:rPr lang="en-US" altLang="zh-CN" dirty="0" smtClean="0"/>
-              <a:t>TP/P)/(</a:t>
-            </a:r>
-            <a:r>
-              <a:rPr lang="en-US" altLang="zh-CN" dirty="0" smtClean="0"/>
-              <a:t>TP</a:t>
+              <a:t>TP/P)/(TP</a:t>
             </a:r>
             <a:r>
               <a:rPr lang="en-US" altLang="zh-CN" dirty="0"/>
@@ -6139,11 +6809,7 @@
             </a:r>
             <a:r>
               <a:rPr lang="en-US" altLang="zh-CN" dirty="0" smtClean="0"/>
-              <a:t>P</a:t>
-            </a:r>
-            <a:r>
-              <a:rPr lang="en-US" altLang="zh-CN" dirty="0" smtClean="0"/>
-              <a:t>)</a:t>
+              <a:t>P)</a:t>
             </a:r>
           </a:p>
           <a:p>
@@ -6238,10 +6904,54 @@
               <a:t> </a:t>
             </a:r>
             <a:r>
-              <a:rPr lang="en-US" altLang="zh-CN" smtClean="0"/>
+              <a:rPr lang="en-US" altLang="zh-CN" dirty="0" smtClean="0"/>
               <a:t>FN+FP)</a:t>
             </a:r>
             <a:endParaRPr lang="en-US" dirty="0"/>
+          </a:p>
+        </p:txBody>
+      </p:sp>
+      <p:sp>
+        <p:nvSpPr>
+          <p:cNvPr id="4" name="Rectangle 3"/>
+          <p:cNvSpPr/>
+          <p:nvPr/>
+        </p:nvSpPr>
+        <p:spPr>
+          <a:xfrm>
+            <a:off x="1472742" y="5765426"/>
+            <a:ext cx="4929555" cy="369332"/>
+          </a:xfrm>
+          <a:prstGeom prst="rect">
+            <a:avLst/>
+          </a:prstGeom>
+        </p:spPr>
+        <p:txBody>
+          <a:bodyPr wrap="none">
+            <a:spAutoFit/>
+          </a:bodyPr>
+          <a:lstStyle/>
+          <a:p>
+            <a:r>
+              <a:rPr lang="en-US" dirty="0" smtClean="0"/>
+              <a:t>知乎  </a:t>
+            </a:r>
+            <a:r>
+              <a:rPr lang="en-US" dirty="0" smtClean="0"/>
+              <a:t>https</a:t>
+            </a:r>
+            <a:r>
+              <a:rPr lang="en-US" dirty="0"/>
+              <a:t>://</a:t>
+            </a:r>
+            <a:r>
+              <a:rPr lang="en-US" dirty="0" err="1"/>
+              <a:t>www.zhihu.com</a:t>
+            </a:r>
+            <a:r>
+              <a:rPr lang="en-US" dirty="0"/>
+              <a:t>/question/30643044</a:t>
+            </a:r>
           </a:p>
         </p:txBody>
       </p:sp>

</xml_diff>